<commit_message>
Small changes to pptx
</commit_message>
<xml_diff>
--- a/Security.pptx
+++ b/Security.pptx
@@ -5294,7 +5294,19 @@
             </a:r>
             <a:r>
               <a:rPr lang="da-DK" dirty="0" smtClean="0"/>
-              <a:t> trafik</a:t>
+              <a:t> </a:t>
+            </a:r>
+            <a:r>
+              <a:rPr lang="da-DK" dirty="0" smtClean="0"/>
+              <a:t>trafik</a:t>
+            </a:r>
+          </a:p>
+          <a:p>
+            <a:r>
+              <a:rPr lang="da-DK" dirty="0" smtClean="0">
+                <a:hlinkClick r:id="rId2"/>
+              </a:rPr>
+              <a:t>Se hvordan her</a:t>
             </a:r>
             <a:endParaRPr lang="da-DK" dirty="0"/>
           </a:p>
@@ -5338,7 +5350,7 @@
           <p:nvPr/>
         </p:nvPicPr>
         <p:blipFill>
-          <a:blip r:embed="rId2" cstate="print">
+          <a:blip r:embed="rId3" cstate="print">
             <a:extLst>
               <a:ext uri="{28A0092B-C50C-407E-A947-70E740481C1C}">
                 <a14:useLocalDpi xmlns:a14="http://schemas.microsoft.com/office/drawing/2010/main" val="0"/>
@@ -5352,7 +5364,7 @@
         </p:blipFill>
         <p:spPr bwMode="auto">
           <a:xfrm>
-            <a:off x="107504" y="188640"/>
+            <a:off x="107504" y="116632"/>
             <a:ext cx="3491880" cy="1277031"/>
           </a:xfrm>
           <a:prstGeom prst="rect">
@@ -5379,7 +5391,7 @@
           <p:nvPr/>
         </p:nvPicPr>
         <p:blipFill>
-          <a:blip r:embed="rId3">
+          <a:blip r:embed="rId4">
             <a:extLst>
               <a:ext uri="{28A0092B-C50C-407E-A947-70E740481C1C}">
                 <a14:useLocalDpi xmlns:a14="http://schemas.microsoft.com/office/drawing/2010/main" val="0"/>
@@ -5411,6 +5423,49 @@
           </a:extLst>
         </p:spPr>
       </p:pic>
+      <p:pic>
+        <p:nvPicPr>
+          <p:cNvPr id="1026" name="Picture 2" descr="Image result for certbot">
+            <a:hlinkClick r:id="rId2"/>
+          </p:cNvPr>
+          <p:cNvPicPr>
+            <a:picLocks noChangeAspect="1" noChangeArrowheads="1"/>
+          </p:cNvPicPr>
+          <p:nvPr/>
+        </p:nvPicPr>
+        <p:blipFill>
+          <a:blip r:embed="rId5">
+            <a:extLst>
+              <a:ext uri="{28A0092B-C50C-407E-A947-70E740481C1C}">
+                <a14:useLocalDpi xmlns:a14="http://schemas.microsoft.com/office/drawing/2010/main" val="0"/>
+              </a:ext>
+            </a:extLst>
+          </a:blip>
+          <a:srcRect/>
+          <a:stretch>
+            <a:fillRect/>
+          </a:stretch>
+        </p:blipFill>
+        <p:spPr bwMode="auto">
+          <a:xfrm>
+            <a:off x="7092280" y="0"/>
+            <a:ext cx="1905000" cy="1905000"/>
+          </a:xfrm>
+          <a:prstGeom prst="rect">
+            <a:avLst/>
+          </a:prstGeom>
+          <a:noFill/>
+          <a:extLst>
+            <a:ext uri="{909E8E84-426E-40DD-AFC4-6F175D3DCCD1}">
+              <a14:hiddenFill xmlns:a14="http://schemas.microsoft.com/office/drawing/2010/main">
+                <a:solidFill>
+                  <a:srgbClr val="FFFFFF"/>
+                </a:solidFill>
+              </a14:hiddenFill>
+            </a:ext>
+          </a:extLst>
+        </p:spPr>
+      </p:pic>
     </p:spTree>
     <p:extLst>
       <p:ext uri="{BB962C8B-B14F-4D97-AF65-F5344CB8AC3E}">
@@ -5421,6 +5476,13 @@
   <p:clrMapOvr>
     <a:masterClrMapping/>
   </p:clrMapOvr>
+  <p:timing>
+    <p:tnLst>
+      <p:par>
+        <p:cTn id="1" dur="indefinite" restart="never" nodeType="tmRoot"/>
+      </p:par>
+    </p:tnLst>
+  </p:timing>
 </p:sld>
 </file>
 
@@ -5728,6 +5790,13 @@
   <p:clrMapOvr>
     <a:masterClrMapping/>
   </p:clrMapOvr>
+  <p:timing>
+    <p:tnLst>
+      <p:par>
+        <p:cTn id="1" dur="indefinite" restart="never" nodeType="tmRoot"/>
+      </p:par>
+    </p:tnLst>
+  </p:timing>
 </p:sld>
 </file>
 
@@ -5902,6 +5971,13 @@
   <p:clrMapOvr>
     <a:masterClrMapping/>
   </p:clrMapOvr>
+  <p:timing>
+    <p:tnLst>
+      <p:par>
+        <p:cTn id="1" dur="indefinite" restart="never" nodeType="tmRoot"/>
+      </p:par>
+    </p:tnLst>
+  </p:timing>
 </p:sld>
 </file>
 
@@ -6047,7 +6123,11 @@
             </a:r>
             <a:r>
               <a:rPr lang="da-DK" dirty="0" smtClean="0"/>
-              <a:t> password sammen med den </a:t>
+              <a:t> password sammen med </a:t>
+            </a:r>
+            <a:r>
+              <a:rPr lang="da-DK" dirty="0" smtClean="0"/>
+              <a:t>det </a:t>
             </a:r>
             <a:r>
               <a:rPr lang="da-DK" dirty="0" err="1" smtClean="0"/>
@@ -6071,6 +6151,13 @@
   <p:clrMapOvr>
     <a:masterClrMapping/>
   </p:clrMapOvr>
+  <p:timing>
+    <p:tnLst>
+      <p:par>
+        <p:cTn id="1" dur="indefinite" restart="never" nodeType="tmRoot"/>
+      </p:par>
+    </p:tnLst>
+  </p:timing>
 </p:sld>
 </file>
 
@@ -6268,6 +6355,13 @@
   <p:clrMapOvr>
     <a:masterClrMapping/>
   </p:clrMapOvr>
+  <p:timing>
+    <p:tnLst>
+      <p:par>
+        <p:cTn id="1" dur="indefinite" restart="never" nodeType="tmRoot"/>
+      </p:par>
+    </p:tnLst>
+  </p:timing>
 </p:sld>
 </file>
 
@@ -6507,6 +6601,13 @@
   <p:clrMapOvr>
     <a:masterClrMapping/>
   </p:clrMapOvr>
+  <p:timing>
+    <p:tnLst>
+      <p:par>
+        <p:cTn id="1" dur="indefinite" restart="never" nodeType="tmRoot"/>
+      </p:par>
+    </p:tnLst>
+  </p:timing>
 </p:sld>
 </file>
 
@@ -7350,6 +7451,13 @@
   <p:clrMapOvr>
     <a:masterClrMapping/>
   </p:clrMapOvr>
+  <p:timing>
+    <p:tnLst>
+      <p:par>
+        <p:cTn id="1" dur="indefinite" restart="never" nodeType="tmRoot"/>
+      </p:par>
+    </p:tnLst>
+  </p:timing>
 </p:sld>
 </file>
 
@@ -7727,6 +7835,13 @@
   <p:clrMapOvr>
     <a:masterClrMapping/>
   </p:clrMapOvr>
+  <p:timing>
+    <p:tnLst>
+      <p:par>
+        <p:cTn id="1" dur="indefinite" restart="never" nodeType="tmRoot"/>
+      </p:par>
+    </p:tnLst>
+  </p:timing>
 </p:sld>
 </file>
 
@@ -7869,6 +7984,13 @@
   <p:clrMapOvr>
     <a:masterClrMapping/>
   </p:clrMapOvr>
+  <p:timing>
+    <p:tnLst>
+      <p:par>
+        <p:cTn id="1" dur="indefinite" restart="never" nodeType="tmRoot"/>
+      </p:par>
+    </p:tnLst>
+  </p:timing>
 </p:sld>
 </file>
 
@@ -8079,6 +8201,13 @@
   <p:clrMapOvr>
     <a:masterClrMapping/>
   </p:clrMapOvr>
+  <p:timing>
+    <p:tnLst>
+      <p:par>
+        <p:cTn id="1" dur="indefinite" restart="never" nodeType="tmRoot"/>
+      </p:par>
+    </p:tnLst>
+  </p:timing>
 </p:sld>
 </file>
 
@@ -8259,6 +8388,13 @@
   <p:clrMapOvr>
     <a:masterClrMapping/>
   </p:clrMapOvr>
+  <p:timing>
+    <p:tnLst>
+      <p:par>
+        <p:cTn id="1" dur="indefinite" restart="never" nodeType="tmRoot"/>
+      </p:par>
+    </p:tnLst>
+  </p:timing>
 </p:sld>
 </file>
 
@@ -8380,9 +8516,33 @@
           <a:p>
             <a:r>
               <a:rPr lang="da-DK" dirty="0" smtClean="0"/>
-              <a:t>Bruge HTTP over TLS</a:t>
-            </a:r>
-            <a:endParaRPr lang="da-DK" dirty="0"/>
+              <a:t>Bruge HTTP over </a:t>
+            </a:r>
+            <a:r>
+              <a:rPr lang="da-DK" dirty="0" smtClean="0"/>
+              <a:t>TLS </a:t>
+            </a:r>
+            <a:r>
+              <a:rPr lang="da-DK" sz="2000" dirty="0" smtClean="0"/>
+              <a:t>(</a:t>
+            </a:r>
+            <a:r>
+              <a:rPr lang="da-DK" sz="2000" dirty="0"/>
+              <a:t>Transport </a:t>
+            </a:r>
+            <a:r>
+              <a:rPr lang="da-DK" sz="2000" dirty="0" err="1"/>
+              <a:t>Layer</a:t>
+            </a:r>
+            <a:r>
+              <a:rPr lang="da-DK" sz="2000" dirty="0"/>
+              <a:t> Security</a:t>
+            </a:r>
+            <a:r>
+              <a:rPr lang="da-DK" sz="2000" dirty="0" smtClean="0"/>
+              <a:t>)</a:t>
+            </a:r>
+            <a:endParaRPr lang="da-DK" sz="2000" dirty="0"/>
           </a:p>
         </p:txBody>
       </p:sp>
@@ -8466,6 +8626,13 @@
   <p:clrMapOvr>
     <a:masterClrMapping/>
   </p:clrMapOvr>
+  <p:timing>
+    <p:tnLst>
+      <p:par>
+        <p:cTn id="1" dur="indefinite" restart="never" nodeType="tmRoot"/>
+      </p:par>
+    </p:tnLst>
+  </p:timing>
 </p:sld>
 </file>
 
@@ -8589,6 +8756,13 @@
   <p:clrMapOvr>
     <a:masterClrMapping/>
   </p:clrMapOvr>
+  <p:timing>
+    <p:tnLst>
+      <p:par>
+        <p:cTn id="1" dur="indefinite" restart="never" nodeType="tmRoot"/>
+      </p:par>
+    </p:tnLst>
+  </p:timing>
 </p:sld>
 </file>
 

</xml_diff>